<commit_message>
Submissions for prototype stage
</commit_message>
<xml_diff>
--- a/PLEDGE_TO_PROGRES_Microsoft_Sustainability_Uttam.pptx
+++ b/PLEDGE_TO_PROGRES_Microsoft_Sustainability_Uttam.pptx
@@ -35271,8 +35271,8 @@
         </p:nvSpPr>
         <p:spPr>
           <a:xfrm>
-            <a:off x="202721" y="2914651"/>
-            <a:ext cx="5546784" cy="2246769"/>
+            <a:off x="394034" y="2378664"/>
+            <a:ext cx="5546784" cy="2677656"/>
           </a:xfrm>
           <a:prstGeom prst="rect">
             <a:avLst/>
@@ -35299,7 +35299,10 @@
               <a:rPr lang="en-US" dirty="0" err="1"/>
               <a:t>Uttam</a:t>
             </a:r>
-            <a:endParaRPr lang="en-US" dirty="0"/>
+            <a:r>
+              <a:rPr lang="en-US" dirty="0"/>
+              <a:t>-Bhumi (The Best Land) </a:t>
+            </a:r>
           </a:p>
           <a:p>
             <a:endParaRPr lang="en-US" dirty="0"/>
@@ -35307,8 +35310,14 @@
           <a:p>
             <a:r>
               <a:rPr lang="en-US" dirty="0"/>
-              <a:t>Your team bio : Vast experience in developing IoT application for Smart metering and Smart home</a:t>
+              <a:t>Your team bio : Technology enthusiast  with special interest in IoT application for Smart metering, Smart home and energy efficiency </a:t>
             </a:r>
+          </a:p>
+          <a:p>
+            <a:endParaRPr lang="en-US" dirty="0"/>
+          </a:p>
+          <a:p>
+            <a:endParaRPr lang="en-US" dirty="0"/>
           </a:p>
           <a:p>
             <a:endParaRPr lang="en-US" dirty="0"/>
@@ -38144,10 +38153,61 @@
               <a:buNone/>
             </a:pPr>
             <a:r>
-              <a:rPr lang="en" sz="1500"/>
+              <a:rPr lang="en" sz="1500" dirty="0"/>
               <a:t>Team member names</a:t>
             </a:r>
-            <a:endParaRPr sz="1500"/>
+          </a:p>
+          <a:p>
+            <a:pPr marL="0" lvl="0" indent="0" algn="l" rtl="0">
+              <a:lnSpc>
+                <a:spcPct val="150000"/>
+              </a:lnSpc>
+              <a:spcBef>
+                <a:spcPts val="0"/>
+              </a:spcBef>
+              <a:spcAft>
+                <a:spcPts val="1600"/>
+              </a:spcAft>
+              <a:buSzPts val="1800"/>
+              <a:buNone/>
+            </a:pPr>
+            <a:r>
+              <a:rPr lang="en" sz="1500" dirty="0" err="1"/>
+              <a:t>Uttam</a:t>
+            </a:r>
+            <a:r>
+              <a:rPr lang="en" sz="1500" dirty="0"/>
+              <a:t> </a:t>
+            </a:r>
+            <a:r>
+              <a:rPr lang="en" sz="1500" dirty="0" err="1"/>
+              <a:t>Kotdiya</a:t>
+            </a:r>
+            <a:endParaRPr lang="en" sz="1500" dirty="0"/>
+          </a:p>
+          <a:p>
+            <a:pPr marL="0" lvl="0" indent="0" algn="l" rtl="0">
+              <a:lnSpc>
+                <a:spcPct val="150000"/>
+              </a:lnSpc>
+              <a:spcBef>
+                <a:spcPts val="0"/>
+              </a:spcBef>
+              <a:spcAft>
+                <a:spcPts val="1600"/>
+              </a:spcAft>
+              <a:buSzPts val="1800"/>
+              <a:buNone/>
+            </a:pPr>
+            <a:r>
+              <a:rPr lang="en" sz="1500" dirty="0"/>
+              <a:t>Bhumika </a:t>
+            </a:r>
+            <a:r>
+              <a:rPr lang="en" sz="1500"/>
+              <a:t>Kotdiya</a:t>
+            </a:r>
+            <a:endParaRPr sz="1500" dirty="0"/>
           </a:p>
         </p:txBody>
       </p:sp>

</xml_diff>